<commit_message>
Change format for 2nd slide, a.k.a. project quad chart slide
</commit_message>
<xml_diff>
--- a/src/main/resources/powerpoint/template.pptx
+++ b/src/main/resources/powerpoint/template.pptx
@@ -6,7 +6,7 @@
   </p:sldMasterIdLst>
   <p:sldIdLst>
     <p:sldId id="256" r:id="rId2"/>
-    <p:sldId id="258" r:id="rId3"/>
+    <p:sldId id="259" r:id="rId3"/>
   </p:sldIdLst>
   <p:sldSz cx="9144000" cy="6858000" type="screen4x3"/>
   <p:notesSz cx="6858000" cy="9144000"/>
@@ -289,7 +289,7 @@
           <a:p>
             <a:fld id="{D79DD528-B3C9-44F8-8886-6F221502FC6C}" type="datetimeFigureOut">
               <a:rPr lang="en-US" smtClean="0"/>
-              <a:t>1/14/16</a:t>
+              <a:t>1/15/2016</a:t>
             </a:fld>
             <a:endParaRPr lang="en-US"/>
           </a:p>
@@ -350,7 +350,7 @@
   <p:timing>
     <p:tnLst>
       <p:par>
-        <p:cTn xmlns:p14="http://schemas.microsoft.com/office/powerpoint/2010/main" id="1" dur="indefinite" restart="never" nodeType="tmRoot"/>
+        <p:cTn id="1" dur="indefinite" restart="never" nodeType="tmRoot"/>
       </p:par>
     </p:tnLst>
   </p:timing>
@@ -466,7 +466,7 @@
           <a:p>
             <a:fld id="{D79DD528-B3C9-44F8-8886-6F221502FC6C}" type="datetimeFigureOut">
               <a:rPr lang="en-US" smtClean="0"/>
-              <a:t>1/14/16</a:t>
+              <a:t>1/15/2016</a:t>
             </a:fld>
             <a:endParaRPr lang="en-US"/>
           </a:p>
@@ -646,7 +646,7 @@
           <a:p>
             <a:fld id="{D79DD528-B3C9-44F8-8886-6F221502FC6C}" type="datetimeFigureOut">
               <a:rPr lang="en-US" smtClean="0"/>
-              <a:t>1/14/16</a:t>
+              <a:t>1/15/2016</a:t>
             </a:fld>
             <a:endParaRPr lang="en-US"/>
           </a:p>
@@ -816,7 +816,7 @@
           <a:p>
             <a:fld id="{D79DD528-B3C9-44F8-8886-6F221502FC6C}" type="datetimeFigureOut">
               <a:rPr lang="en-US" smtClean="0"/>
-              <a:t>1/14/16</a:t>
+              <a:t>1/15/2016</a:t>
             </a:fld>
             <a:endParaRPr lang="en-US"/>
           </a:p>
@@ -1062,7 +1062,7 @@
           <a:p>
             <a:fld id="{D79DD528-B3C9-44F8-8886-6F221502FC6C}" type="datetimeFigureOut">
               <a:rPr lang="en-US" smtClean="0"/>
-              <a:t>1/14/16</a:t>
+              <a:t>1/15/2016</a:t>
             </a:fld>
             <a:endParaRPr lang="en-US"/>
           </a:p>
@@ -1350,7 +1350,7 @@
           <a:p>
             <a:fld id="{D79DD528-B3C9-44F8-8886-6F221502FC6C}" type="datetimeFigureOut">
               <a:rPr lang="en-US" smtClean="0"/>
-              <a:t>1/14/16</a:t>
+              <a:t>1/15/2016</a:t>
             </a:fld>
             <a:endParaRPr lang="en-US"/>
           </a:p>
@@ -1772,7 +1772,7 @@
           <a:p>
             <a:fld id="{D79DD528-B3C9-44F8-8886-6F221502FC6C}" type="datetimeFigureOut">
               <a:rPr lang="en-US" smtClean="0"/>
-              <a:t>1/14/16</a:t>
+              <a:t>1/15/2016</a:t>
             </a:fld>
             <a:endParaRPr lang="en-US"/>
           </a:p>
@@ -1890,7 +1890,7 @@
           <a:p>
             <a:fld id="{D79DD528-B3C9-44F8-8886-6F221502FC6C}" type="datetimeFigureOut">
               <a:rPr lang="en-US" smtClean="0"/>
-              <a:t>1/14/16</a:t>
+              <a:t>1/15/2016</a:t>
             </a:fld>
             <a:endParaRPr lang="en-US"/>
           </a:p>
@@ -1985,7 +1985,7 @@
           <a:p>
             <a:fld id="{D79DD528-B3C9-44F8-8886-6F221502FC6C}" type="datetimeFigureOut">
               <a:rPr lang="en-US" smtClean="0"/>
-              <a:t>1/14/16</a:t>
+              <a:t>1/15/2016</a:t>
             </a:fld>
             <a:endParaRPr lang="en-US"/>
           </a:p>
@@ -2262,7 +2262,7 @@
           <a:p>
             <a:fld id="{D79DD528-B3C9-44F8-8886-6F221502FC6C}" type="datetimeFigureOut">
               <a:rPr lang="en-US" smtClean="0"/>
-              <a:t>1/14/16</a:t>
+              <a:t>1/15/2016</a:t>
             </a:fld>
             <a:endParaRPr lang="en-US"/>
           </a:p>
@@ -2515,7 +2515,7 @@
           <a:p>
             <a:fld id="{D79DD528-B3C9-44F8-8886-6F221502FC6C}" type="datetimeFigureOut">
               <a:rPr lang="en-US" smtClean="0"/>
-              <a:t>1/14/16</a:t>
+              <a:t>1/15/2016</a:t>
             </a:fld>
             <a:endParaRPr lang="en-US"/>
           </a:p>
@@ -2728,7 +2728,7 @@
           <a:p>
             <a:fld id="{D79DD528-B3C9-44F8-8886-6F221502FC6C}" type="datetimeFigureOut">
               <a:rPr lang="en-US" smtClean="0"/>
-              <a:t>1/14/16</a:t>
+              <a:t>1/15/2016</a:t>
             </a:fld>
             <a:endParaRPr lang="en-US"/>
           </a:p>
@@ -2836,7 +2836,7 @@
   <p:timing>
     <p:tnLst>
       <p:par>
-        <p:cTn xmlns:p14="http://schemas.microsoft.com/office/powerpoint/2010/main" id="1" dur="indefinite" restart="never" nodeType="tmRoot"/>
+        <p:cTn id="1" dur="indefinite" restart="never" nodeType="tmRoot"/>
       </p:par>
     </p:tnLst>
   </p:timing>
@@ -3580,7 +3580,7 @@
       </p:grpSpPr>
       <p:sp>
         <p:nvSpPr>
-          <p:cNvPr id="2" name="Title 1"/>
+          <p:cNvPr id="2" name="title"/>
           <p:cNvSpPr>
             <a:spLocks noGrp="1"/>
           </p:cNvSpPr>
@@ -3597,136 +3597,15 @@
         </p:spPr>
         <p:txBody>
           <a:bodyPr>
-            <a:normAutofit fontScale="90000"/>
+            <a:noAutofit/>
           </a:bodyPr>
           <a:lstStyle/>
           <a:p>
             <a:r>
-              <a:rPr lang="en-US" dirty="0" smtClean="0"/>
-              <a:t>(U) XYZ Contract</a:t>
-            </a:r>
-            <a:endParaRPr lang="en-US" dirty="0"/>
-          </a:p>
-        </p:txBody>
-      </p:sp>
-      <p:sp>
-        <p:nvSpPr>
-          <p:cNvPr id="4" name="TextBox 3"/>
-          <p:cNvSpPr txBox="1"/>
-          <p:nvPr/>
-        </p:nvSpPr>
-        <p:spPr>
-          <a:xfrm>
-            <a:off x="1241321" y="1381240"/>
-            <a:ext cx="7428829" cy="369332"/>
-          </a:xfrm>
-          <a:prstGeom prst="rect">
-            <a:avLst/>
-          </a:prstGeom>
-          <a:noFill/>
-        </p:spPr>
-      </p:sp>
-      <p:sp>
-        <p:nvSpPr>
-          <p:cNvPr id="3" name="Subtitle 3"/>
-          <p:cNvSpPr>
-            <a:spLocks noGrp="1"/>
-          </p:cNvSpPr>
-          <p:nvPr>
-            <p:ph idx="1"/>
-          </p:nvPr>
-        </p:nvSpPr>
-        <p:spPr>
-          <a:xfrm>
-            <a:off x="762000" y="914400"/>
-            <a:ext cx="8229600" cy="2133600"/>
-          </a:xfrm>
-        </p:spPr>
-        <p:txBody>
-          <a:bodyPr>
-            <a:normAutofit fontScale="85000" lnSpcReduction="20000"/>
-          </a:bodyPr>
-          <a:lstStyle/>
-          <a:p>
-            <a:r>
-              <a:rPr lang="en-US" sz="1400" dirty="0" smtClean="0"/>
-              <a:t>NUMBER : xyz000-000-0000</a:t>
-            </a:r>
-          </a:p>
-          <a:p>
-            <a:r>
-              <a:rPr lang="en-US" sz="1400" smtClean="0"/>
-              <a:t>CLASS</a:t>
-            </a:r>
-            <a:r>
-              <a:rPr lang="en-US" sz="1400" dirty="0" smtClean="0"/>
-              <a:t>: CPFF</a:t>
-            </a:r>
-          </a:p>
-          <a:p>
-            <a:r>
-              <a:rPr lang="en-US" sz="1400" dirty="0" smtClean="0"/>
-              <a:t>SPONSORS: 1000000</a:t>
-            </a:r>
-            <a:endParaRPr lang="en-US" sz="1400" dirty="0"/>
-          </a:p>
-          <a:p>
-            <a:r>
-              <a:rPr lang="en-US" sz="1400" dirty="0" smtClean="0"/>
-              <a:t>CUSTOMERS : 16600000</a:t>
-            </a:r>
-            <a:endParaRPr lang="en-US" sz="1400" dirty="0"/>
-          </a:p>
-          <a:p>
-            <a:r>
-              <a:rPr lang="en-US" sz="1400" dirty="0" smtClean="0"/>
-              <a:t>PARTNERS: 2010-09-03</a:t>
-            </a:r>
-            <a:endParaRPr lang="en-US" sz="1400" dirty="0"/>
-          </a:p>
-          <a:p>
-            <a:r>
-              <a:rPr lang="en-US" sz="1400" dirty="0" smtClean="0"/>
-              <a:t>TRANSITION AGENT: 2020-07-31</a:t>
-            </a:r>
-            <a:endParaRPr lang="en-US" sz="1400" dirty="0"/>
-          </a:p>
-          <a:p>
-            <a:r>
-              <a:rPr lang="en-US" sz="1400" dirty="0" smtClean="0"/>
-              <a:t>CONTRACT: XYZ Corporation</a:t>
-            </a:r>
-            <a:endParaRPr lang="en-US" sz="1400" dirty="0"/>
-          </a:p>
-          <a:p>
-            <a:r>
-              <a:rPr lang="en-US" sz="1400" dirty="0" smtClean="0"/>
-              <a:t>STAKEHOLDERS: Complete the contract for the development of Next System</a:t>
-            </a:r>
-          </a:p>
-          <a:p>
-            <a:r>
-              <a:rPr lang="en-US" sz="1400" dirty="0" smtClean="0"/>
-              <a:t>STATE</a:t>
-            </a:r>
-          </a:p>
-          <a:p>
-            <a:r>
-              <a:rPr lang="en-US" sz="1400" dirty="0" smtClean="0"/>
-              <a:t>STRATEGY</a:t>
-            </a:r>
-          </a:p>
-          <a:p>
-            <a:r>
-              <a:rPr lang="en-US" sz="1400" dirty="0" smtClean="0"/>
-              <a:t>ISSUES</a:t>
-            </a:r>
-          </a:p>
-          <a:p>
-            <a:pPr marL="0" indent="0">
-              <a:buNone/>
-            </a:pPr>
-            <a:endParaRPr lang="en-US" sz="1400" dirty="0"/>
+              <a:rPr lang="en-US" sz="3600" dirty="0" smtClean="0"/>
+              <a:t>project</a:t>
+            </a:r>
+            <a:endParaRPr lang="en-US" sz="3600" dirty="0"/>
           </a:p>
         </p:txBody>
       </p:sp>
@@ -3739,14 +3618,14 @@
           <p:nvPr>
             <p:extLst>
               <p:ext uri="{D42A27DB-BD31-4B8C-83A1-F6EECF244321}">
-                <p14:modId xmlns:p14="http://schemas.microsoft.com/office/powerpoint/2010/main" val="2114798799"/>
+                <p14:modId xmlns:p14="http://schemas.microsoft.com/office/powerpoint/2010/main" val="3556452996"/>
               </p:ext>
             </p:extLst>
           </p:nvPr>
         </p:nvGraphicFramePr>
         <p:xfrm>
-          <a:off x="838200" y="3352800"/>
-          <a:ext cx="7924801" cy="910300"/>
+          <a:off x="4572000" y="3631220"/>
+          <a:ext cx="4419601" cy="940780"/>
         </p:xfrm>
         <a:graphic>
           <a:graphicData uri="http://schemas.openxmlformats.org/drawingml/2006/table">
@@ -3755,29 +3634,29 @@
                 <a:tableStyleId>{5C22544A-7EE6-4342-B048-85BDC9FD1C3A}</a:tableStyleId>
               </a:tblPr>
               <a:tblGrid>
-                <a:gridCol w="1132114"/>
-                <a:gridCol w="1253848"/>
-                <a:gridCol w="1463227"/>
-                <a:gridCol w="1056640"/>
-                <a:gridCol w="1056640"/>
-                <a:gridCol w="830218"/>
-                <a:gridCol w="1132114"/>
+                <a:gridCol w="533400"/>
+                <a:gridCol w="685800"/>
+                <a:gridCol w="914400"/>
+                <a:gridCol w="665481"/>
+                <a:gridCol w="589280"/>
+                <a:gridCol w="399869"/>
+                <a:gridCol w="631371"/>
               </a:tblGrid>
-              <a:tr h="347579">
+              <a:tr h="304800">
                 <a:tc>
                   <a:txBody>
                     <a:bodyPr/>
                     <a:lstStyle/>
                     <a:p>
                       <a:r>
-                        <a:rPr lang="en-US" dirty="0" smtClean="0"/>
+                        <a:rPr lang="en-US" sz="1000" dirty="0" smtClean="0"/>
                         <a:t>Burn</a:t>
                       </a:r>
                       <a:r>
-                        <a:rPr lang="en-US" baseline="0" dirty="0" smtClean="0"/>
+                        <a:rPr lang="en-US" sz="1000" baseline="0" dirty="0" smtClean="0"/>
                         <a:t> rate</a:t>
                       </a:r>
-                      <a:endParaRPr lang="en-US" dirty="0"/>
+                      <a:endParaRPr lang="en-US" sz="1000" dirty="0"/>
                     </a:p>
                   </a:txBody>
                   <a:tcPr/>
@@ -3788,10 +3667,10 @@
                     <a:lstStyle/>
                     <a:p>
                       <a:r>
-                        <a:rPr lang="en-US" dirty="0" smtClean="0"/>
+                        <a:rPr lang="en-US" sz="1000" dirty="0" smtClean="0"/>
                         <a:t>Schedule</a:t>
                       </a:r>
-                      <a:endParaRPr lang="en-US" dirty="0"/>
+                      <a:endParaRPr lang="en-US" sz="1000" dirty="0"/>
                     </a:p>
                   </a:txBody>
                   <a:tcPr/>
@@ -3802,10 +3681,10 @@
                     <a:lstStyle/>
                     <a:p>
                       <a:r>
-                        <a:rPr lang="en-US" dirty="0" smtClean="0"/>
+                        <a:rPr lang="en-US" sz="1000" dirty="0" smtClean="0"/>
                         <a:t>Performance</a:t>
                       </a:r>
-                      <a:endParaRPr lang="en-US" dirty="0"/>
+                      <a:endParaRPr lang="en-US" sz="1000" dirty="0"/>
                     </a:p>
                   </a:txBody>
                   <a:tcPr/>
@@ -3816,10 +3695,10 @@
                     <a:lstStyle/>
                     <a:p>
                       <a:r>
-                        <a:rPr lang="en-US" dirty="0" smtClean="0"/>
+                        <a:rPr lang="en-US" sz="1000" dirty="0" smtClean="0"/>
                         <a:t>Funding</a:t>
                       </a:r>
-                      <a:endParaRPr lang="en-US" dirty="0"/>
+                      <a:endParaRPr lang="en-US" sz="1000" dirty="0"/>
                     </a:p>
                   </a:txBody>
                   <a:tcPr/>
@@ -3830,10 +3709,10 @@
                     <a:lstStyle/>
                     <a:p>
                       <a:r>
-                        <a:rPr lang="en-US" dirty="0" smtClean="0"/>
+                        <a:rPr lang="en-US" sz="1000" dirty="0" smtClean="0"/>
                         <a:t>Sustain</a:t>
                       </a:r>
-                      <a:endParaRPr lang="en-US" dirty="0"/>
+                      <a:endParaRPr lang="en-US" sz="1000" dirty="0"/>
                     </a:p>
                   </a:txBody>
                   <a:tcPr/>
@@ -3844,10 +3723,10 @@
                     <a:lstStyle/>
                     <a:p>
                       <a:r>
-                        <a:rPr lang="en-US" dirty="0" smtClean="0"/>
+                        <a:rPr lang="en-US" sz="1000" dirty="0" smtClean="0"/>
                         <a:t>Risk</a:t>
                       </a:r>
-                      <a:endParaRPr lang="en-US" dirty="0"/>
+                      <a:endParaRPr lang="en-US" sz="1000" dirty="0"/>
                     </a:p>
                   </a:txBody>
                   <a:tcPr/>
@@ -3858,10 +3737,10 @@
                     <a:lstStyle/>
                     <a:p>
                       <a:r>
-                        <a:rPr lang="en-US" dirty="0" smtClean="0"/>
+                        <a:rPr lang="en-US" sz="1000" dirty="0" smtClean="0"/>
                         <a:t>Issues</a:t>
                       </a:r>
-                      <a:endParaRPr lang="en-US" dirty="0"/>
+                      <a:endParaRPr lang="en-US" sz="1000" dirty="0"/>
                     </a:p>
                   </a:txBody>
                   <a:tcPr/>
@@ -3873,203 +3752,769 @@
                     <a:bodyPr/>
                     <a:lstStyle/>
                     <a:p>
-                      <a:endParaRPr lang="en-US" dirty="0"/>
+                      <a:endParaRPr lang="en-US" sz="1000" dirty="0"/>
                     </a:p>
                   </a:txBody>
-                  <a:tcPr/>
+                  <a:tcPr>
+                    <a:solidFill>
+                      <a:srgbClr val="00B050"/>
+                    </a:solidFill>
+                  </a:tcPr>
                 </a:tc>
                 <a:tc>
                   <a:txBody>
                     <a:bodyPr/>
                     <a:lstStyle/>
                     <a:p>
-                      <a:endParaRPr lang="en-US" dirty="0"/>
+                      <a:endParaRPr lang="en-US" sz="1000" dirty="0"/>
                     </a:p>
                   </a:txBody>
-                  <a:tcPr/>
+                  <a:tcPr>
+                    <a:solidFill>
+                      <a:srgbClr val="FFFF00"/>
+                    </a:solidFill>
+                  </a:tcPr>
                 </a:tc>
                 <a:tc>
                   <a:txBody>
                     <a:bodyPr/>
                     <a:lstStyle/>
                     <a:p>
-                      <a:endParaRPr lang="en-US" dirty="0"/>
+                      <a:endParaRPr lang="en-US" sz="1000" dirty="0"/>
                     </a:p>
                   </a:txBody>
-                  <a:tcPr/>
+                  <a:tcPr>
+                    <a:solidFill>
+                      <a:srgbClr val="FF0000"/>
+                    </a:solidFill>
+                  </a:tcPr>
                 </a:tc>
                 <a:tc>
                   <a:txBody>
                     <a:bodyPr/>
                     <a:lstStyle/>
                     <a:p>
-                      <a:endParaRPr lang="en-US" dirty="0"/>
+                      <a:endParaRPr lang="en-US" sz="1000" dirty="0"/>
                     </a:p>
                   </a:txBody>
-                  <a:tcPr/>
+                  <a:tcPr>
+                    <a:solidFill>
+                      <a:srgbClr val="00B050"/>
+                    </a:solidFill>
+                  </a:tcPr>
                 </a:tc>
                 <a:tc>
                   <a:txBody>
                     <a:bodyPr/>
                     <a:lstStyle/>
                     <a:p>
-                      <a:endParaRPr lang="en-US" dirty="0"/>
+                      <a:endParaRPr lang="en-US" sz="1000" dirty="0"/>
                     </a:p>
                   </a:txBody>
-                  <a:tcPr/>
+                  <a:tcPr>
+                    <a:solidFill>
+                      <a:srgbClr val="FFFF00"/>
+                    </a:solidFill>
+                  </a:tcPr>
                 </a:tc>
                 <a:tc>
                   <a:txBody>
                     <a:bodyPr/>
                     <a:lstStyle/>
                     <a:p>
-                      <a:endParaRPr lang="en-US" dirty="0"/>
+                      <a:endParaRPr lang="en-US" sz="1000" dirty="0"/>
                     </a:p>
                   </a:txBody>
-                  <a:tcPr/>
+                  <a:tcPr>
+                    <a:solidFill>
+                      <a:srgbClr val="FF0000"/>
+                    </a:solidFill>
+                  </a:tcPr>
                 </a:tc>
                 <a:tc>
                   <a:txBody>
                     <a:bodyPr/>
                     <a:lstStyle/>
                     <a:p>
-                      <a:endParaRPr lang="en-US" dirty="0"/>
+                      <a:endParaRPr lang="en-US" sz="1000" dirty="0"/>
                     </a:p>
                   </a:txBody>
-                  <a:tcPr/>
+                  <a:tcPr>
+                    <a:solidFill>
+                      <a:srgbClr val="00B050"/>
+                    </a:solidFill>
+                  </a:tcPr>
                 </a:tc>
               </a:tr>
             </a:tbl>
           </a:graphicData>
         </a:graphic>
       </p:graphicFrame>
-      <p:graphicFrame>
-        <p:nvGraphicFramePr>
-          <p:cNvPr id="5" name="Table 4"/>
-          <p:cNvGraphicFramePr>
-            <a:graphicFrameLocks noGrp="1"/>
-          </p:cNvGraphicFramePr>
-          <p:nvPr>
-            <p:extLst>
-              <p:ext uri="{D42A27DB-BD31-4B8C-83A1-F6EECF244321}">
-                <p14:modId xmlns:p14="http://schemas.microsoft.com/office/powerpoint/2010/main" val="1746251494"/>
-              </p:ext>
-            </p:extLst>
-          </p:nvPr>
-        </p:nvGraphicFramePr>
-        <p:xfrm>
-          <a:off x="838200" y="4572000"/>
-          <a:ext cx="6096000" cy="741680"/>
-        </p:xfrm>
-        <a:graphic>
-          <a:graphicData uri="http://schemas.openxmlformats.org/drawingml/2006/table">
-            <a:tbl>
-              <a:tblPr firstRow="1" bandRow="1">
-                <a:tableStyleId>{5C22544A-7EE6-4342-B048-85BDC9FD1C3A}</a:tableStyleId>
-              </a:tblPr>
-              <a:tblGrid>
-                <a:gridCol w="2032000"/>
-                <a:gridCol w="2032000"/>
-                <a:gridCol w="2032000"/>
-              </a:tblGrid>
-              <a:tr h="370840">
-                <a:tc>
-                  <a:txBody>
-                    <a:bodyPr/>
-                    <a:lstStyle/>
-                    <a:p>
-                      <a:r>
-                        <a:rPr lang="en-US" dirty="0" smtClean="0"/>
-                        <a:t>Funding</a:t>
-                      </a:r>
-                      <a:r>
-                        <a:rPr lang="en-US" baseline="0" dirty="0" smtClean="0"/>
-                        <a:t> Type</a:t>
-                      </a:r>
-                      <a:endParaRPr lang="en-US" dirty="0"/>
-                    </a:p>
-                  </a:txBody>
-                  <a:tcPr/>
-                </a:tc>
-                <a:tc>
-                  <a:txBody>
-                    <a:bodyPr/>
-                    <a:lstStyle/>
-                    <a:p>
-                      <a:r>
-                        <a:rPr lang="en-US" dirty="0" smtClean="0"/>
-                        <a:t>Fiscal</a:t>
-                      </a:r>
-                      <a:r>
-                        <a:rPr lang="en-US" baseline="0" dirty="0" smtClean="0"/>
-                        <a:t> Year</a:t>
-                      </a:r>
-                      <a:endParaRPr lang="en-US" dirty="0"/>
-                    </a:p>
-                  </a:txBody>
-                  <a:tcPr/>
-                </a:tc>
-                <a:tc>
-                  <a:txBody>
-                    <a:bodyPr/>
-                    <a:lstStyle/>
-                    <a:p>
-                      <a:r>
-                        <a:rPr lang="en-US" dirty="0" smtClean="0"/>
-                        <a:t>Status</a:t>
-                      </a:r>
-                      <a:endParaRPr lang="en-US" dirty="0"/>
-                    </a:p>
-                  </a:txBody>
-                  <a:tcPr/>
-                </a:tc>
-              </a:tr>
-              <a:tr h="370840">
-                <a:tc>
-                  <a:txBody>
-                    <a:bodyPr/>
-                    <a:lstStyle/>
-                    <a:p>
-                      <a:endParaRPr lang="en-US"/>
-                    </a:p>
-                  </a:txBody>
-                  <a:tcPr/>
-                </a:tc>
-                <a:tc>
-                  <a:txBody>
-                    <a:bodyPr/>
-                    <a:lstStyle/>
-                    <a:p>
-                      <a:endParaRPr lang="en-US"/>
-                    </a:p>
-                  </a:txBody>
-                  <a:tcPr/>
-                </a:tc>
-                <a:tc>
-                  <a:txBody>
-                    <a:bodyPr/>
-                    <a:lstStyle/>
-                    <a:p>
-                      <a:endParaRPr lang="en-US" dirty="0"/>
-                    </a:p>
-                  </a:txBody>
-                  <a:tcPr/>
-                </a:tc>
-              </a:tr>
-            </a:tbl>
-          </a:graphicData>
-        </a:graphic>
-      </p:graphicFrame>
+      <p:sp>
+        <p:nvSpPr>
+          <p:cNvPr id="7" name="last-update"/>
+          <p:cNvSpPr txBox="1"/>
+          <p:nvPr/>
+        </p:nvSpPr>
+        <p:spPr>
+          <a:xfrm>
+            <a:off x="7010400" y="136071"/>
+            <a:ext cx="1888350" cy="381000"/>
+          </a:xfrm>
+          <a:prstGeom prst="rect">
+            <a:avLst/>
+          </a:prstGeom>
+          <a:noFill/>
+        </p:spPr>
+        <p:txBody>
+          <a:bodyPr wrap="square" rtlCol="0">
+            <a:spAutoFit/>
+          </a:bodyPr>
+          <a:lstStyle/>
+          <a:p>
+            <a:r>
+              <a:rPr lang="en-US" smtClean="0"/>
+              <a:t>last-update123</a:t>
+            </a:r>
+            <a:endParaRPr lang="en-US" dirty="0"/>
+          </a:p>
+        </p:txBody>
+      </p:sp>
+      <p:cxnSp>
+        <p:nvCxnSpPr>
+          <p:cNvPr id="10" name="Straight Connector 9"/>
+          <p:cNvCxnSpPr/>
+          <p:nvPr/>
+        </p:nvCxnSpPr>
+        <p:spPr>
+          <a:xfrm>
+            <a:off x="76200" y="1283732"/>
+            <a:ext cx="8915400" cy="11668"/>
+          </a:xfrm>
+          <a:prstGeom prst="line">
+            <a:avLst/>
+          </a:prstGeom>
+          <a:ln w="28575"/>
+        </p:spPr>
+        <p:style>
+          <a:lnRef idx="1">
+            <a:schemeClr val="accent1"/>
+          </a:lnRef>
+          <a:fillRef idx="0">
+            <a:schemeClr val="accent1"/>
+          </a:fillRef>
+          <a:effectRef idx="0">
+            <a:schemeClr val="accent1"/>
+          </a:effectRef>
+          <a:fontRef idx="minor">
+            <a:schemeClr val="tx1"/>
+          </a:fontRef>
+        </p:style>
+      </p:cxnSp>
+      <p:grpSp>
+        <p:nvGrpSpPr>
+          <p:cNvPr id="39" name="Group 38"/>
+          <p:cNvGrpSpPr/>
+          <p:nvPr/>
+        </p:nvGrpSpPr>
+        <p:grpSpPr>
+          <a:xfrm>
+            <a:off x="0" y="914400"/>
+            <a:ext cx="8991600" cy="5791200"/>
+            <a:chOff x="0" y="914400"/>
+            <a:chExt cx="8991600" cy="5791200"/>
+          </a:xfrm>
+        </p:grpSpPr>
+        <p:cxnSp>
+          <p:nvCxnSpPr>
+            <p:cNvPr id="8" name="Straight Connector 7"/>
+            <p:cNvCxnSpPr/>
+            <p:nvPr/>
+          </p:nvCxnSpPr>
+          <p:spPr>
+            <a:xfrm>
+              <a:off x="76200" y="914400"/>
+              <a:ext cx="8915400" cy="0"/>
+            </a:xfrm>
+            <a:prstGeom prst="line">
+              <a:avLst/>
+            </a:prstGeom>
+            <a:ln w="28575"/>
+          </p:spPr>
+          <p:style>
+            <a:lnRef idx="1">
+              <a:schemeClr val="accent1"/>
+            </a:lnRef>
+            <a:fillRef idx="0">
+              <a:schemeClr val="accent1"/>
+            </a:fillRef>
+            <a:effectRef idx="0">
+              <a:schemeClr val="accent1"/>
+            </a:effectRef>
+            <a:fontRef idx="minor">
+              <a:schemeClr val="tx1"/>
+            </a:fontRef>
+          </p:style>
+        </p:cxnSp>
+        <p:sp>
+          <p:nvSpPr>
+            <p:cNvPr id="9" name="requirement"/>
+            <p:cNvSpPr txBox="1"/>
+            <p:nvPr/>
+          </p:nvSpPr>
+          <p:spPr>
+            <a:xfrm>
+              <a:off x="0" y="914400"/>
+              <a:ext cx="8991600" cy="369332"/>
+            </a:xfrm>
+            <a:prstGeom prst="rect">
+              <a:avLst/>
+            </a:prstGeom>
+            <a:noFill/>
+          </p:spPr>
+          <p:txBody>
+            <a:bodyPr wrap="square" rtlCol="0">
+              <a:spAutoFit/>
+            </a:bodyPr>
+            <a:lstStyle/>
+            <a:p>
+              <a:r>
+                <a:rPr lang="en-US" dirty="0" smtClean="0"/>
+                <a:t>Requirement:</a:t>
+              </a:r>
+              <a:endParaRPr lang="en-US" dirty="0"/>
+            </a:p>
+          </p:txBody>
+        </p:sp>
+        <p:cxnSp>
+          <p:nvCxnSpPr>
+            <p:cNvPr id="13" name="Straight Connector 12"/>
+            <p:cNvCxnSpPr/>
+            <p:nvPr/>
+          </p:nvCxnSpPr>
+          <p:spPr>
+            <a:xfrm>
+              <a:off x="4495800" y="1295400"/>
+              <a:ext cx="0" cy="5410200"/>
+            </a:xfrm>
+            <a:prstGeom prst="line">
+              <a:avLst/>
+            </a:prstGeom>
+            <a:ln w="28575"/>
+          </p:spPr>
+          <p:style>
+            <a:lnRef idx="1">
+              <a:schemeClr val="accent1"/>
+            </a:lnRef>
+            <a:fillRef idx="0">
+              <a:schemeClr val="accent1"/>
+            </a:fillRef>
+            <a:effectRef idx="0">
+              <a:schemeClr val="accent1"/>
+            </a:effectRef>
+            <a:fontRef idx="minor">
+              <a:schemeClr val="tx1"/>
+            </a:fontRef>
+          </p:style>
+        </p:cxnSp>
+        <p:cxnSp>
+          <p:nvCxnSpPr>
+            <p:cNvPr id="15" name="Straight Connector 14"/>
+            <p:cNvCxnSpPr/>
+            <p:nvPr/>
+          </p:nvCxnSpPr>
+          <p:spPr>
+            <a:xfrm>
+              <a:off x="114300" y="3521018"/>
+              <a:ext cx="8839200" cy="0"/>
+            </a:xfrm>
+            <a:prstGeom prst="line">
+              <a:avLst/>
+            </a:prstGeom>
+            <a:ln w="28575"/>
+          </p:spPr>
+          <p:style>
+            <a:lnRef idx="1">
+              <a:schemeClr val="accent1"/>
+            </a:lnRef>
+            <a:fillRef idx="0">
+              <a:schemeClr val="accent1"/>
+            </a:fillRef>
+            <a:effectRef idx="0">
+              <a:schemeClr val="accent1"/>
+            </a:effectRef>
+            <a:fontRef idx="minor">
+              <a:schemeClr val="tx1"/>
+            </a:fontRef>
+          </p:style>
+        </p:cxnSp>
+      </p:grpSp>
+      <p:sp>
+        <p:nvSpPr>
+          <p:cNvPr id="27" name="description-label"/>
+          <p:cNvSpPr txBox="1"/>
+          <p:nvPr/>
+        </p:nvSpPr>
+        <p:spPr>
+          <a:xfrm>
+            <a:off x="4572000" y="1339334"/>
+            <a:ext cx="4419600" cy="369332"/>
+          </a:xfrm>
+          <a:prstGeom prst="rect">
+            <a:avLst/>
+          </a:prstGeom>
+          <a:noFill/>
+        </p:spPr>
+        <p:txBody>
+          <a:bodyPr wrap="square" rtlCol="0">
+            <a:spAutoFit/>
+          </a:bodyPr>
+          <a:lstStyle/>
+          <a:p>
+            <a:r>
+              <a:rPr lang="en-US" b="1" u="sng" dirty="0" smtClean="0"/>
+              <a:t>PROJECT DESCRIPTION:</a:t>
+            </a:r>
+            <a:endParaRPr lang="en-US" b="1" u="sng" dirty="0"/>
+          </a:p>
+        </p:txBody>
+      </p:sp>
+      <p:sp>
+        <p:nvSpPr>
+          <p:cNvPr id="28" name="description"/>
+          <p:cNvSpPr txBox="1"/>
+          <p:nvPr/>
+        </p:nvSpPr>
+        <p:spPr>
+          <a:xfrm>
+            <a:off x="4724400" y="1828800"/>
+            <a:ext cx="4174350" cy="584775"/>
+          </a:xfrm>
+          <a:prstGeom prst="rect">
+            <a:avLst/>
+          </a:prstGeom>
+          <a:noFill/>
+        </p:spPr>
+        <p:txBody>
+          <a:bodyPr wrap="square" rtlCol="0">
+            <a:spAutoFit/>
+          </a:bodyPr>
+          <a:lstStyle/>
+          <a:p>
+            <a:pPr marL="285750" indent="-285750">
+              <a:buFont typeface="Arial" pitchFamily="34" charset="0"/>
+              <a:buChar char="•"/>
+            </a:pPr>
+            <a:r>
+              <a:rPr lang="en-US" sz="1600" dirty="0" smtClean="0"/>
+              <a:t>ABC</a:t>
+            </a:r>
+          </a:p>
+          <a:p>
+            <a:endParaRPr lang="en-US" sz="1600" dirty="0"/>
+          </a:p>
+        </p:txBody>
+      </p:sp>
+      <p:sp>
+        <p:nvSpPr>
+          <p:cNvPr id="29" name="sponsor"/>
+          <p:cNvSpPr txBox="1"/>
+          <p:nvPr/>
+        </p:nvSpPr>
+        <p:spPr>
+          <a:xfrm>
+            <a:off x="76200" y="3826209"/>
+            <a:ext cx="4267200" cy="307777"/>
+          </a:xfrm>
+          <a:prstGeom prst="rect">
+            <a:avLst/>
+          </a:prstGeom>
+          <a:noFill/>
+        </p:spPr>
+        <p:txBody>
+          <a:bodyPr wrap="square" rtlCol="0">
+            <a:spAutoFit/>
+          </a:bodyPr>
+          <a:lstStyle/>
+          <a:p>
+            <a:r>
+              <a:rPr lang="en-US" sz="1400" dirty="0" smtClean="0"/>
+              <a:t>SPONSOR: </a:t>
+            </a:r>
+            <a:endParaRPr lang="en-US" sz="1400" dirty="0"/>
+          </a:p>
+        </p:txBody>
+      </p:sp>
+      <p:sp>
+        <p:nvSpPr>
+          <p:cNvPr id="30" name="ic-mission-partners"/>
+          <p:cNvSpPr txBox="1"/>
+          <p:nvPr/>
+        </p:nvSpPr>
+        <p:spPr>
+          <a:xfrm>
+            <a:off x="76200" y="4599486"/>
+            <a:ext cx="4267200" cy="307777"/>
+          </a:xfrm>
+          <a:prstGeom prst="rect">
+            <a:avLst/>
+          </a:prstGeom>
+          <a:noFill/>
+        </p:spPr>
+        <p:txBody>
+          <a:bodyPr wrap="square" rtlCol="0">
+            <a:spAutoFit/>
+          </a:bodyPr>
+          <a:lstStyle/>
+          <a:p>
+            <a:r>
+              <a:rPr lang="en-US" sz="1400" dirty="0" smtClean="0"/>
+              <a:t>IC MISSION PARTNERS: </a:t>
+            </a:r>
+            <a:endParaRPr lang="en-US" sz="1400" dirty="0"/>
+          </a:p>
+        </p:txBody>
+      </p:sp>
+      <p:sp>
+        <p:nvSpPr>
+          <p:cNvPr id="31" name="customer"/>
+          <p:cNvSpPr txBox="1"/>
+          <p:nvPr/>
+        </p:nvSpPr>
+        <p:spPr>
+          <a:xfrm>
+            <a:off x="76200" y="4197106"/>
+            <a:ext cx="4267200" cy="307777"/>
+          </a:xfrm>
+          <a:prstGeom prst="rect">
+            <a:avLst/>
+          </a:prstGeom>
+          <a:noFill/>
+        </p:spPr>
+        <p:txBody>
+          <a:bodyPr wrap="square" rtlCol="0">
+            <a:spAutoFit/>
+          </a:bodyPr>
+          <a:lstStyle/>
+          <a:p>
+            <a:r>
+              <a:rPr lang="en-US" sz="1400" dirty="0" smtClean="0"/>
+              <a:t>CUSTOMER: </a:t>
+            </a:r>
+            <a:endParaRPr lang="en-US" sz="1400" dirty="0"/>
+          </a:p>
+        </p:txBody>
+      </p:sp>
+      <p:sp>
+        <p:nvSpPr>
+          <p:cNvPr id="32" name="ic-transition-agent"/>
+          <p:cNvSpPr txBox="1"/>
+          <p:nvPr/>
+        </p:nvSpPr>
+        <p:spPr>
+          <a:xfrm>
+            <a:off x="76200" y="4957932"/>
+            <a:ext cx="4267200" cy="307777"/>
+          </a:xfrm>
+          <a:prstGeom prst="rect">
+            <a:avLst/>
+          </a:prstGeom>
+          <a:noFill/>
+        </p:spPr>
+        <p:txBody>
+          <a:bodyPr wrap="square" rtlCol="0">
+            <a:spAutoFit/>
+          </a:bodyPr>
+          <a:lstStyle/>
+          <a:p>
+            <a:r>
+              <a:rPr lang="en-US" sz="1400" dirty="0" smtClean="0"/>
+              <a:t>TRANSITION AGENT: </a:t>
+            </a:r>
+            <a:endParaRPr lang="en-US" sz="1400" dirty="0"/>
+          </a:p>
+        </p:txBody>
+      </p:sp>
+      <p:sp>
+        <p:nvSpPr>
+          <p:cNvPr id="33" name="contract-name"/>
+          <p:cNvSpPr txBox="1"/>
+          <p:nvPr/>
+        </p:nvSpPr>
+        <p:spPr>
+          <a:xfrm>
+            <a:off x="76200" y="5339715"/>
+            <a:ext cx="4267200" cy="307777"/>
+          </a:xfrm>
+          <a:prstGeom prst="rect">
+            <a:avLst/>
+          </a:prstGeom>
+          <a:noFill/>
+        </p:spPr>
+        <p:txBody>
+          <a:bodyPr wrap="square" rtlCol="0">
+            <a:spAutoFit/>
+          </a:bodyPr>
+          <a:lstStyle/>
+          <a:p>
+            <a:r>
+              <a:rPr lang="en-US" sz="1400" dirty="0" smtClean="0"/>
+              <a:t>Contract Name: </a:t>
+            </a:r>
+            <a:endParaRPr lang="en-US" sz="1400" dirty="0"/>
+          </a:p>
+        </p:txBody>
+      </p:sp>
+      <p:sp>
+        <p:nvSpPr>
+          <p:cNvPr id="34" name="prime"/>
+          <p:cNvSpPr txBox="1"/>
+          <p:nvPr/>
+        </p:nvSpPr>
+        <p:spPr>
+          <a:xfrm>
+            <a:off x="76200" y="5709047"/>
+            <a:ext cx="4267200" cy="307777"/>
+          </a:xfrm>
+          <a:prstGeom prst="rect">
+            <a:avLst/>
+          </a:prstGeom>
+          <a:noFill/>
+        </p:spPr>
+        <p:txBody>
+          <a:bodyPr wrap="square" rtlCol="0">
+            <a:spAutoFit/>
+          </a:bodyPr>
+          <a:lstStyle/>
+          <a:p>
+            <a:r>
+              <a:rPr lang="en-US" sz="1400" dirty="0" smtClean="0"/>
+              <a:t>PRIME: </a:t>
+            </a:r>
+            <a:endParaRPr lang="en-US" sz="1400" dirty="0"/>
+          </a:p>
+        </p:txBody>
+      </p:sp>
+      <p:sp>
+        <p:nvSpPr>
+          <p:cNvPr id="35" name="interagency-agreement"/>
+          <p:cNvSpPr txBox="1"/>
+          <p:nvPr/>
+        </p:nvSpPr>
+        <p:spPr>
+          <a:xfrm>
+            <a:off x="76200" y="6013847"/>
+            <a:ext cx="4267200" cy="307777"/>
+          </a:xfrm>
+          <a:prstGeom prst="rect">
+            <a:avLst/>
+          </a:prstGeom>
+          <a:noFill/>
+        </p:spPr>
+        <p:txBody>
+          <a:bodyPr wrap="square" rtlCol="0">
+            <a:spAutoFit/>
+          </a:bodyPr>
+          <a:lstStyle/>
+          <a:p>
+            <a:r>
+              <a:rPr lang="en-US" sz="1400" dirty="0" smtClean="0"/>
+              <a:t>INTERAGENCY AGREEMENT: </a:t>
+            </a:r>
+            <a:endParaRPr lang="en-US" sz="1400" dirty="0"/>
+          </a:p>
+        </p:txBody>
+      </p:sp>
+      <p:sp>
+        <p:nvSpPr>
+          <p:cNvPr id="36" name="security-classification-guide"/>
+          <p:cNvSpPr txBox="1"/>
+          <p:nvPr/>
+        </p:nvSpPr>
+        <p:spPr>
+          <a:xfrm>
+            <a:off x="76200" y="6321623"/>
+            <a:ext cx="4267200" cy="307777"/>
+          </a:xfrm>
+          <a:prstGeom prst="rect">
+            <a:avLst/>
+          </a:prstGeom>
+          <a:noFill/>
+        </p:spPr>
+        <p:txBody>
+          <a:bodyPr wrap="square" rtlCol="0">
+            <a:spAutoFit/>
+          </a:bodyPr>
+          <a:lstStyle/>
+          <a:p>
+            <a:r>
+              <a:rPr lang="en-US" sz="1400" dirty="0" smtClean="0"/>
+              <a:t>SECURITY CLASSIFICATION GUIDE: </a:t>
+            </a:r>
+            <a:endParaRPr lang="en-US" sz="1400" dirty="0"/>
+          </a:p>
+        </p:txBody>
+      </p:sp>
+      <p:sp>
+        <p:nvSpPr>
+          <p:cNvPr id="37" name="project-status-label"/>
+          <p:cNvSpPr txBox="1"/>
+          <p:nvPr/>
+        </p:nvSpPr>
+        <p:spPr>
+          <a:xfrm>
+            <a:off x="4533900" y="4773266"/>
+            <a:ext cx="3429000" cy="369332"/>
+          </a:xfrm>
+          <a:prstGeom prst="rect">
+            <a:avLst/>
+          </a:prstGeom>
+          <a:noFill/>
+        </p:spPr>
+        <p:txBody>
+          <a:bodyPr wrap="square" rtlCol="0">
+            <a:spAutoFit/>
+          </a:bodyPr>
+          <a:lstStyle/>
+          <a:p>
+            <a:r>
+              <a:rPr lang="en-US" b="1" u="sng" dirty="0" smtClean="0"/>
+              <a:t>PROJECT STATUS</a:t>
+            </a:r>
+            <a:endParaRPr lang="en-US" b="1" u="sng" dirty="0"/>
+          </a:p>
+        </p:txBody>
+      </p:sp>
+      <p:sp>
+        <p:nvSpPr>
+          <p:cNvPr id="38" name="project-status"/>
+          <p:cNvSpPr txBox="1"/>
+          <p:nvPr/>
+        </p:nvSpPr>
+        <p:spPr>
+          <a:xfrm>
+            <a:off x="4572000" y="5096470"/>
+            <a:ext cx="3048000" cy="923330"/>
+          </a:xfrm>
+          <a:prstGeom prst="rect">
+            <a:avLst/>
+          </a:prstGeom>
+          <a:noFill/>
+        </p:spPr>
+        <p:txBody>
+          <a:bodyPr wrap="square" rtlCol="0">
+            <a:spAutoFit/>
+          </a:bodyPr>
+          <a:lstStyle/>
+          <a:p>
+            <a:pPr marL="285750" indent="-285750">
+              <a:buFont typeface="Arial" pitchFamily="34" charset="0"/>
+              <a:buChar char="•"/>
+            </a:pPr>
+            <a:r>
+              <a:rPr lang="en-US" dirty="0" smtClean="0"/>
+              <a:t>X</a:t>
+            </a:r>
+          </a:p>
+          <a:p>
+            <a:pPr marL="285750" indent="-285750">
+              <a:buFont typeface="Arial" pitchFamily="34" charset="0"/>
+              <a:buChar char="•"/>
+            </a:pPr>
+            <a:r>
+              <a:rPr lang="en-US" dirty="0" smtClean="0"/>
+              <a:t>Y</a:t>
+            </a:r>
+          </a:p>
+          <a:p>
+            <a:pPr marL="285750" indent="-285750">
+              <a:buFont typeface="Arial" pitchFamily="34" charset="0"/>
+              <a:buChar char="•"/>
+            </a:pPr>
+            <a:r>
+              <a:rPr lang="en-US" dirty="0"/>
+              <a:t>Z</a:t>
+            </a:r>
+          </a:p>
+        </p:txBody>
+      </p:sp>
+      <p:sp>
+        <p:nvSpPr>
+          <p:cNvPr id="40" name="funding-type-label"/>
+          <p:cNvSpPr txBox="1"/>
+          <p:nvPr/>
+        </p:nvSpPr>
+        <p:spPr>
+          <a:xfrm>
+            <a:off x="4572000" y="6019800"/>
+            <a:ext cx="1676400" cy="383977"/>
+          </a:xfrm>
+          <a:prstGeom prst="rect">
+            <a:avLst/>
+          </a:prstGeom>
+          <a:noFill/>
+        </p:spPr>
+        <p:txBody>
+          <a:bodyPr wrap="square" rtlCol="0">
+            <a:spAutoFit/>
+          </a:bodyPr>
+          <a:lstStyle/>
+          <a:p>
+            <a:r>
+              <a:rPr lang="en-US" b="1" dirty="0" smtClean="0"/>
+              <a:t>FUNDING TYPE: </a:t>
+            </a:r>
+            <a:endParaRPr lang="en-US" b="1" dirty="0"/>
+          </a:p>
+        </p:txBody>
+      </p:sp>
+      <p:sp>
+        <p:nvSpPr>
+          <p:cNvPr id="41" name="funding-type"/>
+          <p:cNvSpPr txBox="1"/>
+          <p:nvPr/>
+        </p:nvSpPr>
+        <p:spPr>
+          <a:xfrm>
+            <a:off x="6237514" y="6040866"/>
+            <a:ext cx="2628900" cy="369332"/>
+          </a:xfrm>
+          <a:prstGeom prst="rect">
+            <a:avLst/>
+          </a:prstGeom>
+          <a:noFill/>
+        </p:spPr>
+        <p:txBody>
+          <a:bodyPr wrap="square" rtlCol="0">
+            <a:spAutoFit/>
+          </a:bodyPr>
+          <a:lstStyle/>
+          <a:p>
+            <a:r>
+              <a:rPr lang="en-US" dirty="0" smtClean="0"/>
+              <a:t>(U) FFO: FY14 $2.5 million</a:t>
+            </a:r>
+            <a:endParaRPr lang="en-US" dirty="0"/>
+          </a:p>
+        </p:txBody>
+      </p:sp>
     </p:spTree>
     <p:extLst>
       <p:ext uri="{BB962C8B-B14F-4D97-AF65-F5344CB8AC3E}">
-        <p14:creationId xmlns:p14="http://schemas.microsoft.com/office/powerpoint/2010/main" val="2270203758"/>
+        <p14:creationId xmlns:p14="http://schemas.microsoft.com/office/powerpoint/2010/main" val="3520663452"/>
       </p:ext>
     </p:extLst>
   </p:cSld>
   <p:clrMapOvr>
     <a:masterClrMapping/>
   </p:clrMapOvr>
+  <p:timing>
+    <p:tnLst>
+      <p:par>
+        <p:cTn id="1" dur="indefinite" restart="never" nodeType="tmRoot"/>
+      </p:par>
+    </p:tnLst>
+  </p:timing>
 </p:sld>
 </file>
 

</xml_diff>